<commit_message>
Business rule archetype finished.
</commit_message>
<xml_diff>
--- a/profiles/madeja_ir_english/icons/icons.pptx
+++ b/profiles/madeja_ir_english/icons/icons.pptx
@@ -104,6 +104,11 @@
       </a:defRPr>
     </a:lvl9pPr>
   </p:defaultTextStyle>
+  <p:extLst>
+    <p:ext uri="{EFAFB233-063F-42B5-8137-9DF3F51BA10A}">
+      <p15:sldGuideLst xmlns:p15="http://schemas.microsoft.com/office/powerpoint/2012/main"/>
+    </p:ext>
+  </p:extLst>
 </p:presentation>
 </file>
 
@@ -254,7 +259,7 @@
           <a:p>
             <a:fld id="{740CBF9C-6FDD-4182-97AF-D1BF5F7C50EB}" type="datetimeFigureOut">
               <a:rPr lang="es-ES" smtClean="0"/>
-              <a:t>12/10/2024</a:t>
+              <a:t>13/10/2024</a:t>
             </a:fld>
             <a:endParaRPr lang="es-ES"/>
           </a:p>
@@ -452,7 +457,7 @@
           <a:p>
             <a:fld id="{740CBF9C-6FDD-4182-97AF-D1BF5F7C50EB}" type="datetimeFigureOut">
               <a:rPr lang="es-ES" smtClean="0"/>
-              <a:t>12/10/2024</a:t>
+              <a:t>13/10/2024</a:t>
             </a:fld>
             <a:endParaRPr lang="es-ES"/>
           </a:p>
@@ -660,7 +665,7 @@
           <a:p>
             <a:fld id="{740CBF9C-6FDD-4182-97AF-D1BF5F7C50EB}" type="datetimeFigureOut">
               <a:rPr lang="es-ES" smtClean="0"/>
-              <a:t>12/10/2024</a:t>
+              <a:t>13/10/2024</a:t>
             </a:fld>
             <a:endParaRPr lang="es-ES"/>
           </a:p>
@@ -858,7 +863,7 @@
           <a:p>
             <a:fld id="{740CBF9C-6FDD-4182-97AF-D1BF5F7C50EB}" type="datetimeFigureOut">
               <a:rPr lang="es-ES" smtClean="0"/>
-              <a:t>12/10/2024</a:t>
+              <a:t>13/10/2024</a:t>
             </a:fld>
             <a:endParaRPr lang="es-ES"/>
           </a:p>
@@ -1133,7 +1138,7 @@
           <a:p>
             <a:fld id="{740CBF9C-6FDD-4182-97AF-D1BF5F7C50EB}" type="datetimeFigureOut">
               <a:rPr lang="es-ES" smtClean="0"/>
-              <a:t>12/10/2024</a:t>
+              <a:t>13/10/2024</a:t>
             </a:fld>
             <a:endParaRPr lang="es-ES"/>
           </a:p>
@@ -1398,7 +1403,7 @@
           <a:p>
             <a:fld id="{740CBF9C-6FDD-4182-97AF-D1BF5F7C50EB}" type="datetimeFigureOut">
               <a:rPr lang="es-ES" smtClean="0"/>
-              <a:t>12/10/2024</a:t>
+              <a:t>13/10/2024</a:t>
             </a:fld>
             <a:endParaRPr lang="es-ES"/>
           </a:p>
@@ -1810,7 +1815,7 @@
           <a:p>
             <a:fld id="{740CBF9C-6FDD-4182-97AF-D1BF5F7C50EB}" type="datetimeFigureOut">
               <a:rPr lang="es-ES" smtClean="0"/>
-              <a:t>12/10/2024</a:t>
+              <a:t>13/10/2024</a:t>
             </a:fld>
             <a:endParaRPr lang="es-ES"/>
           </a:p>
@@ -1951,7 +1956,7 @@
           <a:p>
             <a:fld id="{740CBF9C-6FDD-4182-97AF-D1BF5F7C50EB}" type="datetimeFigureOut">
               <a:rPr lang="es-ES" smtClean="0"/>
-              <a:t>12/10/2024</a:t>
+              <a:t>13/10/2024</a:t>
             </a:fld>
             <a:endParaRPr lang="es-ES"/>
           </a:p>
@@ -2064,7 +2069,7 @@
           <a:p>
             <a:fld id="{740CBF9C-6FDD-4182-97AF-D1BF5F7C50EB}" type="datetimeFigureOut">
               <a:rPr lang="es-ES" smtClean="0"/>
-              <a:t>12/10/2024</a:t>
+              <a:t>13/10/2024</a:t>
             </a:fld>
             <a:endParaRPr lang="es-ES"/>
           </a:p>
@@ -2375,7 +2380,7 @@
           <a:p>
             <a:fld id="{740CBF9C-6FDD-4182-97AF-D1BF5F7C50EB}" type="datetimeFigureOut">
               <a:rPr lang="es-ES" smtClean="0"/>
-              <a:t>12/10/2024</a:t>
+              <a:t>13/10/2024</a:t>
             </a:fld>
             <a:endParaRPr lang="es-ES"/>
           </a:p>
@@ -2663,7 +2668,7 @@
           <a:p>
             <a:fld id="{740CBF9C-6FDD-4182-97AF-D1BF5F7C50EB}" type="datetimeFigureOut">
               <a:rPr lang="es-ES" smtClean="0"/>
-              <a:t>12/10/2024</a:t>
+              <a:t>13/10/2024</a:t>
             </a:fld>
             <a:endParaRPr lang="es-ES"/>
           </a:p>
@@ -2904,7 +2909,7 @@
           <a:p>
             <a:fld id="{740CBF9C-6FDD-4182-97AF-D1BF5F7C50EB}" type="datetimeFigureOut">
               <a:rPr lang="es-ES" smtClean="0"/>
-              <a:t>12/10/2024</a:t>
+              <a:t>13/10/2024</a:t>
             </a:fld>
             <a:endParaRPr lang="es-ES"/>
           </a:p>
@@ -3721,6 +3726,131 @@
           <a:prstGeom prst="rect">
             <a:avLst/>
           </a:prstGeom>
+        </p:spPr>
+      </p:pic>
+      <p:pic>
+        <p:nvPicPr>
+          <p:cNvPr id="7" name="Imagen 6" descr="Icono&#10;&#10;Descripción generada automáticamente">
+            <a:extLst>
+              <a:ext uri="{FF2B5EF4-FFF2-40B4-BE49-F238E27FC236}">
+                <a16:creationId xmlns:a16="http://schemas.microsoft.com/office/drawing/2014/main" id="{57349D46-DB2D-F4DC-BCF9-FE7AC651DC15}"/>
+              </a:ext>
+            </a:extLst>
+          </p:cNvPr>
+          <p:cNvPicPr>
+            <a:picLocks noChangeAspect="1"/>
+          </p:cNvPicPr>
+          <p:nvPr/>
+        </p:nvPicPr>
+        <p:blipFill>
+          <a:blip r:embed="rId6">
+            <a:clrChange>
+              <a:clrFrom>
+                <a:srgbClr val="000000">
+                  <a:alpha val="0"/>
+                </a:srgbClr>
+              </a:clrFrom>
+              <a:clrTo>
+                <a:srgbClr val="000000">
+                  <a:alpha val="0"/>
+                </a:srgbClr>
+              </a:clrTo>
+            </a:clrChange>
+            <a:extLst>
+              <a:ext uri="{BEBA8EAE-BF5A-486C-A8C5-ECC9F3942E4B}">
+                <a14:imgProps xmlns:a14="http://schemas.microsoft.com/office/drawing/2010/main">
+                  <a14:imgLayer r:embed="rId7">
+                    <a14:imgEffect>
+                      <a14:backgroundRemoval t="8594" b="90625" l="9082" r="90723">
+                        <a14:foregroundMark x1="49121" y1="8594" x2="49121" y2="8594"/>
+                        <a14:foregroundMark x1="90820" y1="49316" x2="90820" y2="49316"/>
+                        <a14:foregroundMark x1="87500" y1="80469" x2="87500" y2="80469"/>
+                        <a14:foregroundMark x1="49805" y1="90625" x2="49805" y2="90625"/>
+                        <a14:foregroundMark x1="9082" y1="45801" x2="9082" y2="45801"/>
+                        <a14:backgroundMark x1="6152" y1="3613" x2="6152" y2="3613"/>
+                      </a14:backgroundRemoval>
+                    </a14:imgEffect>
+                  </a14:imgLayer>
+                </a14:imgProps>
+              </a:ext>
+            </a:extLst>
+          </a:blip>
+          <a:stretch>
+            <a:fillRect/>
+          </a:stretch>
+        </p:blipFill>
+        <p:spPr>
+          <a:xfrm>
+            <a:off x="7264399" y="1100730"/>
+            <a:ext cx="3871161" cy="3871161"/>
+          </a:xfrm>
+          <a:prstGeom prst="rect">
+            <a:avLst/>
+          </a:prstGeom>
+          <a:solidFill>
+            <a:srgbClr val="7030A0"/>
+          </a:solidFill>
+        </p:spPr>
+      </p:pic>
+      <p:pic>
+        <p:nvPicPr>
+          <p:cNvPr id="9" name="Imagen 8" descr="Icono&#10;&#10;Descripción generada automáticamente">
+            <a:extLst>
+              <a:ext uri="{FF2B5EF4-FFF2-40B4-BE49-F238E27FC236}">
+                <a16:creationId xmlns:a16="http://schemas.microsoft.com/office/drawing/2014/main" id="{F11D9699-3E32-1083-1CB1-86FAF10DE09D}"/>
+              </a:ext>
+            </a:extLst>
+          </p:cNvPr>
+          <p:cNvPicPr>
+            <a:picLocks noChangeAspect="1"/>
+          </p:cNvPicPr>
+          <p:nvPr/>
+        </p:nvPicPr>
+        <p:blipFill>
+          <a:blip r:embed="rId6">
+            <a:clrChange>
+              <a:clrFrom>
+                <a:srgbClr val="000000">
+                  <a:alpha val="0"/>
+                </a:srgbClr>
+              </a:clrFrom>
+              <a:clrTo>
+                <a:srgbClr val="000000">
+                  <a:alpha val="0"/>
+                </a:srgbClr>
+              </a:clrTo>
+            </a:clrChange>
+            <a:extLst>
+              <a:ext uri="{BEBA8EAE-BF5A-486C-A8C5-ECC9F3942E4B}">
+                <a14:imgProps xmlns:a14="http://schemas.microsoft.com/office/drawing/2010/main">
+                  <a14:imgLayer r:embed="rId7">
+                    <a14:imgEffect>
+                      <a14:backgroundRemoval t="8594" b="90625" l="9082" r="90723">
+                        <a14:foregroundMark x1="49121" y1="8594" x2="49121" y2="8594"/>
+                        <a14:foregroundMark x1="90820" y1="49316" x2="90820" y2="49316"/>
+                        <a14:foregroundMark x1="87500" y1="80469" x2="87500" y2="80469"/>
+                        <a14:foregroundMark x1="49805" y1="90625" x2="49805" y2="90625"/>
+                        <a14:foregroundMark x1="9082" y1="45801" x2="9082" y2="45801"/>
+                        <a14:backgroundMark x1="6152" y1="3613" x2="6152" y2="3613"/>
+                      </a14:backgroundRemoval>
+                    </a14:imgEffect>
+                  </a14:imgLayer>
+                </a14:imgProps>
+              </a:ext>
+            </a:extLst>
+          </a:blip>
+          <a:srcRect l="6736" t="6300" r="6862" b="6930"/>
+          <a:stretch/>
+        </p:blipFill>
+        <p:spPr>
+          <a:xfrm>
+            <a:off x="729916" y="1100730"/>
+            <a:ext cx="3344779" cy="3358976"/>
+          </a:xfrm>
+          <a:prstGeom prst="rect">
+            <a:avLst/>
+          </a:prstGeom>
+          <a:noFill/>
         </p:spPr>
       </p:pic>
     </p:spTree>

</xml_diff>

<commit_message>
Functional and nonfunctional requirements archetypes revised.
</commit_message>
<xml_diff>
--- a/profiles/madeja_ir_english/icons/icons.pptx
+++ b/profiles/madeja_ir_english/icons/icons.pptx
@@ -6,6 +6,8 @@
   </p:sldMasterIdLst>
   <p:sldIdLst>
     <p:sldId id="257" r:id="rId2"/>
+    <p:sldId id="258" r:id="rId3"/>
+    <p:sldId id="259" r:id="rId4"/>
   </p:sldIdLst>
   <p:sldSz cx="12192000" cy="6858000"/>
   <p:notesSz cx="6858000" cy="9144000"/>
@@ -259,7 +261,7 @@
           <a:p>
             <a:fld id="{740CBF9C-6FDD-4182-97AF-D1BF5F7C50EB}" type="datetimeFigureOut">
               <a:rPr lang="es-ES" smtClean="0"/>
-              <a:t>13/10/2024</a:t>
+              <a:t>16/10/2024</a:t>
             </a:fld>
             <a:endParaRPr lang="es-ES"/>
           </a:p>
@@ -457,7 +459,7 @@
           <a:p>
             <a:fld id="{740CBF9C-6FDD-4182-97AF-D1BF5F7C50EB}" type="datetimeFigureOut">
               <a:rPr lang="es-ES" smtClean="0"/>
-              <a:t>13/10/2024</a:t>
+              <a:t>16/10/2024</a:t>
             </a:fld>
             <a:endParaRPr lang="es-ES"/>
           </a:p>
@@ -665,7 +667,7 @@
           <a:p>
             <a:fld id="{740CBF9C-6FDD-4182-97AF-D1BF5F7C50EB}" type="datetimeFigureOut">
               <a:rPr lang="es-ES" smtClean="0"/>
-              <a:t>13/10/2024</a:t>
+              <a:t>16/10/2024</a:t>
             </a:fld>
             <a:endParaRPr lang="es-ES"/>
           </a:p>
@@ -863,7 +865,7 @@
           <a:p>
             <a:fld id="{740CBF9C-6FDD-4182-97AF-D1BF5F7C50EB}" type="datetimeFigureOut">
               <a:rPr lang="es-ES" smtClean="0"/>
-              <a:t>13/10/2024</a:t>
+              <a:t>16/10/2024</a:t>
             </a:fld>
             <a:endParaRPr lang="es-ES"/>
           </a:p>
@@ -1138,7 +1140,7 @@
           <a:p>
             <a:fld id="{740CBF9C-6FDD-4182-97AF-D1BF5F7C50EB}" type="datetimeFigureOut">
               <a:rPr lang="es-ES" smtClean="0"/>
-              <a:t>13/10/2024</a:t>
+              <a:t>16/10/2024</a:t>
             </a:fld>
             <a:endParaRPr lang="es-ES"/>
           </a:p>
@@ -1403,7 +1405,7 @@
           <a:p>
             <a:fld id="{740CBF9C-6FDD-4182-97AF-D1BF5F7C50EB}" type="datetimeFigureOut">
               <a:rPr lang="es-ES" smtClean="0"/>
-              <a:t>13/10/2024</a:t>
+              <a:t>16/10/2024</a:t>
             </a:fld>
             <a:endParaRPr lang="es-ES"/>
           </a:p>
@@ -1815,7 +1817,7 @@
           <a:p>
             <a:fld id="{740CBF9C-6FDD-4182-97AF-D1BF5F7C50EB}" type="datetimeFigureOut">
               <a:rPr lang="es-ES" smtClean="0"/>
-              <a:t>13/10/2024</a:t>
+              <a:t>16/10/2024</a:t>
             </a:fld>
             <a:endParaRPr lang="es-ES"/>
           </a:p>
@@ -1956,7 +1958,7 @@
           <a:p>
             <a:fld id="{740CBF9C-6FDD-4182-97AF-D1BF5F7C50EB}" type="datetimeFigureOut">
               <a:rPr lang="es-ES" smtClean="0"/>
-              <a:t>13/10/2024</a:t>
+              <a:t>16/10/2024</a:t>
             </a:fld>
             <a:endParaRPr lang="es-ES"/>
           </a:p>
@@ -2069,7 +2071,7 @@
           <a:p>
             <a:fld id="{740CBF9C-6FDD-4182-97AF-D1BF5F7C50EB}" type="datetimeFigureOut">
               <a:rPr lang="es-ES" smtClean="0"/>
-              <a:t>13/10/2024</a:t>
+              <a:t>16/10/2024</a:t>
             </a:fld>
             <a:endParaRPr lang="es-ES"/>
           </a:p>
@@ -2380,7 +2382,7 @@
           <a:p>
             <a:fld id="{740CBF9C-6FDD-4182-97AF-D1BF5F7C50EB}" type="datetimeFigureOut">
               <a:rPr lang="es-ES" smtClean="0"/>
-              <a:t>13/10/2024</a:t>
+              <a:t>16/10/2024</a:t>
             </a:fld>
             <a:endParaRPr lang="es-ES"/>
           </a:p>
@@ -2668,7 +2670,7 @@
           <a:p>
             <a:fld id="{740CBF9C-6FDD-4182-97AF-D1BF5F7C50EB}" type="datetimeFigureOut">
               <a:rPr lang="es-ES" smtClean="0"/>
-              <a:t>13/10/2024</a:t>
+              <a:t>16/10/2024</a:t>
             </a:fld>
             <a:endParaRPr lang="es-ES"/>
           </a:p>
@@ -2909,7 +2911,7 @@
           <a:p>
             <a:fld id="{740CBF9C-6FDD-4182-97AF-D1BF5F7C50EB}" type="datetimeFigureOut">
               <a:rPr lang="es-ES" smtClean="0"/>
-              <a:t>13/10/2024</a:t>
+              <a:t>16/10/2024</a:t>
             </a:fld>
             <a:endParaRPr lang="es-ES"/>
           </a:p>
@@ -3866,6 +3868,1331 @@
 </p:sld>
 </file>
 
+<file path=ppt/slides/slide2.xml><?xml version="1.0" encoding="utf-8"?>
+<p:sld xmlns:a="http://schemas.openxmlformats.org/drawingml/2006/main" xmlns:r="http://schemas.openxmlformats.org/officeDocument/2006/relationships" xmlns:p="http://schemas.openxmlformats.org/presentationml/2006/main">
+  <p:cSld>
+    <p:spTree>
+      <p:nvGrpSpPr>
+        <p:cNvPr id="1" name=""/>
+        <p:cNvGrpSpPr/>
+        <p:nvPr/>
+      </p:nvGrpSpPr>
+      <p:grpSpPr>
+        <a:xfrm>
+          <a:off x="0" y="0"/>
+          <a:ext cx="0" cy="0"/>
+          <a:chOff x="0" y="0"/>
+          <a:chExt cx="0" cy="0"/>
+        </a:xfrm>
+      </p:grpSpPr>
+      <p:pic>
+        <p:nvPicPr>
+          <p:cNvPr id="2" name="Imagen 1" descr="Icono&#10;&#10;Descripción generada automáticamente">
+            <a:extLst>
+              <a:ext uri="{FF2B5EF4-FFF2-40B4-BE49-F238E27FC236}">
+                <a16:creationId xmlns:a16="http://schemas.microsoft.com/office/drawing/2014/main" id="{EFDA082D-DD87-D214-9FF6-747041D29134}"/>
+              </a:ext>
+            </a:extLst>
+          </p:cNvPr>
+          <p:cNvPicPr>
+            <a:picLocks noChangeAspect="1"/>
+          </p:cNvPicPr>
+          <p:nvPr/>
+        </p:nvPicPr>
+        <p:blipFill>
+          <a:blip r:embed="rId2">
+            <a:clrChange>
+              <a:clrFrom>
+                <a:srgbClr val="000000">
+                  <a:alpha val="0"/>
+                </a:srgbClr>
+              </a:clrFrom>
+              <a:clrTo>
+                <a:srgbClr val="000000">
+                  <a:alpha val="0"/>
+                </a:srgbClr>
+              </a:clrTo>
+            </a:clrChange>
+            <a:extLst>
+              <a:ext uri="{BEBA8EAE-BF5A-486C-A8C5-ECC9F3942E4B}">
+                <a14:imgProps xmlns:a14="http://schemas.microsoft.com/office/drawing/2010/main">
+                  <a14:imgLayer r:embed="rId3">
+                    <a14:imgEffect>
+                      <a14:backgroundRemoval t="8594" b="90625" l="9082" r="90723">
+                        <a14:foregroundMark x1="49121" y1="8594" x2="49121" y2="8594"/>
+                        <a14:foregroundMark x1="90820" y1="49316" x2="90820" y2="49316"/>
+                        <a14:foregroundMark x1="87500" y1="80469" x2="87500" y2="80469"/>
+                        <a14:foregroundMark x1="49805" y1="90625" x2="49805" y2="90625"/>
+                        <a14:foregroundMark x1="9082" y1="45801" x2="9082" y2="45801"/>
+                        <a14:backgroundMark x1="6152" y1="3613" x2="6152" y2="3613"/>
+                      </a14:backgroundRemoval>
+                    </a14:imgEffect>
+                  </a14:imgLayer>
+                </a14:imgProps>
+              </a:ext>
+            </a:extLst>
+          </a:blip>
+          <a:srcRect l="6736" t="6300" r="6862" b="6930"/>
+          <a:stretch/>
+        </p:blipFill>
+        <p:spPr>
+          <a:xfrm>
+            <a:off x="498096" y="366635"/>
+            <a:ext cx="3344779" cy="3358976"/>
+          </a:xfrm>
+          <a:prstGeom prst="rect">
+            <a:avLst/>
+          </a:prstGeom>
+          <a:noFill/>
+        </p:spPr>
+      </p:pic>
+      <p:pic>
+        <p:nvPicPr>
+          <p:cNvPr id="4" name="Imagen 3" descr="Una caricatura de una persona&#10;&#10;Descripción generada automáticamente con confianza baja">
+            <a:extLst>
+              <a:ext uri="{FF2B5EF4-FFF2-40B4-BE49-F238E27FC236}">
+                <a16:creationId xmlns:a16="http://schemas.microsoft.com/office/drawing/2014/main" id="{0C38D8D7-2441-2523-EFFF-9591AEF29740}"/>
+              </a:ext>
+            </a:extLst>
+          </p:cNvPr>
+          <p:cNvPicPr>
+            <a:picLocks noChangeAspect="1"/>
+          </p:cNvPicPr>
+          <p:nvPr/>
+        </p:nvPicPr>
+        <p:blipFill>
+          <a:blip r:embed="rId4"/>
+          <a:stretch>
+            <a:fillRect/>
+          </a:stretch>
+        </p:blipFill>
+        <p:spPr>
+          <a:xfrm>
+            <a:off x="4094417" y="520540"/>
+            <a:ext cx="2908460" cy="2908460"/>
+          </a:xfrm>
+          <a:prstGeom prst="rect">
+            <a:avLst/>
+          </a:prstGeom>
+        </p:spPr>
+      </p:pic>
+      <p:pic>
+        <p:nvPicPr>
+          <p:cNvPr id="6" name="Imagen 5" descr="Un dibujo de una persona&#10;&#10;Descripción generada automáticamente con confianza baja">
+            <a:extLst>
+              <a:ext uri="{FF2B5EF4-FFF2-40B4-BE49-F238E27FC236}">
+                <a16:creationId xmlns:a16="http://schemas.microsoft.com/office/drawing/2014/main" id="{BC96DEDD-09E1-AE67-3093-A1F1FBF7FC43}"/>
+              </a:ext>
+            </a:extLst>
+          </p:cNvPr>
+          <p:cNvPicPr>
+            <a:picLocks noChangeAspect="1"/>
+          </p:cNvPicPr>
+          <p:nvPr/>
+        </p:nvPicPr>
+        <p:blipFill>
+          <a:blip r:embed="rId5"/>
+          <a:stretch>
+            <a:fillRect/>
+          </a:stretch>
+        </p:blipFill>
+        <p:spPr>
+          <a:xfrm>
+            <a:off x="4416008" y="3725611"/>
+            <a:ext cx="2908460" cy="2908460"/>
+          </a:xfrm>
+          <a:prstGeom prst="rect">
+            <a:avLst/>
+          </a:prstGeom>
+        </p:spPr>
+      </p:pic>
+      <p:pic>
+        <p:nvPicPr>
+          <p:cNvPr id="8" name="Imagen 7" descr="Logotipo&#10;&#10;Descripción generada automáticamente con confianza media">
+            <a:extLst>
+              <a:ext uri="{FF2B5EF4-FFF2-40B4-BE49-F238E27FC236}">
+                <a16:creationId xmlns:a16="http://schemas.microsoft.com/office/drawing/2014/main" id="{BE911C04-8A80-43D3-B666-520E2D0EB9F6}"/>
+              </a:ext>
+            </a:extLst>
+          </p:cNvPr>
+          <p:cNvPicPr>
+            <a:picLocks noChangeAspect="1"/>
+          </p:cNvPicPr>
+          <p:nvPr/>
+        </p:nvPicPr>
+        <p:blipFill>
+          <a:blip r:embed="rId6"/>
+          <a:stretch>
+            <a:fillRect/>
+          </a:stretch>
+        </p:blipFill>
+        <p:spPr>
+          <a:xfrm>
+            <a:off x="8675900" y="229694"/>
+            <a:ext cx="3199306" cy="3199306"/>
+          </a:xfrm>
+          <a:prstGeom prst="rect">
+            <a:avLst/>
+          </a:prstGeom>
+        </p:spPr>
+      </p:pic>
+      <p:pic>
+        <p:nvPicPr>
+          <p:cNvPr id="11" name="Imagen 10" descr="Icono&#10;&#10;Descripción generada automáticamente">
+            <a:extLst>
+              <a:ext uri="{FF2B5EF4-FFF2-40B4-BE49-F238E27FC236}">
+                <a16:creationId xmlns:a16="http://schemas.microsoft.com/office/drawing/2014/main" id="{E1220DC8-8A94-9397-1F11-CF699FD99517}"/>
+              </a:ext>
+            </a:extLst>
+          </p:cNvPr>
+          <p:cNvPicPr>
+            <a:picLocks noChangeAspect="1"/>
+          </p:cNvPicPr>
+          <p:nvPr/>
+        </p:nvPicPr>
+        <p:blipFill>
+          <a:blip r:embed="rId2">
+            <a:clrChange>
+              <a:clrFrom>
+                <a:srgbClr val="000000">
+                  <a:alpha val="0"/>
+                </a:srgbClr>
+              </a:clrFrom>
+              <a:clrTo>
+                <a:srgbClr val="000000">
+                  <a:alpha val="0"/>
+                </a:srgbClr>
+              </a:clrTo>
+            </a:clrChange>
+            <a:extLst>
+              <a:ext uri="{BEBA8EAE-BF5A-486C-A8C5-ECC9F3942E4B}">
+                <a14:imgProps xmlns:a14="http://schemas.microsoft.com/office/drawing/2010/main">
+                  <a14:imgLayer r:embed="rId3">
+                    <a14:imgEffect>
+                      <a14:backgroundRemoval t="8594" b="90625" l="9082" r="90723">
+                        <a14:foregroundMark x1="49121" y1="8594" x2="49121" y2="8594"/>
+                        <a14:foregroundMark x1="90820" y1="49316" x2="90820" y2="49316"/>
+                        <a14:foregroundMark x1="87500" y1="80469" x2="87500" y2="80469"/>
+                        <a14:foregroundMark x1="49805" y1="90625" x2="49805" y2="90625"/>
+                        <a14:foregroundMark x1="9082" y1="45801" x2="9082" y2="45801"/>
+                        <a14:backgroundMark x1="6152" y1="3613" x2="6152" y2="3613"/>
+                      </a14:backgroundRemoval>
+                    </a14:imgEffect>
+                  </a14:imgLayer>
+                </a14:imgProps>
+              </a:ext>
+            </a:extLst>
+          </a:blip>
+          <a:srcRect l="6736" t="6300" r="6862" b="6930"/>
+          <a:stretch/>
+        </p:blipFill>
+        <p:spPr>
+          <a:xfrm>
+            <a:off x="8052344" y="2874812"/>
+            <a:ext cx="3344779" cy="3358976"/>
+          </a:xfrm>
+          <a:prstGeom prst="rect">
+            <a:avLst/>
+          </a:prstGeom>
+          <a:noFill/>
+        </p:spPr>
+      </p:pic>
+      <p:grpSp>
+        <p:nvGrpSpPr>
+          <p:cNvPr id="12" name="Grupo 11">
+            <a:extLst>
+              <a:ext uri="{FF2B5EF4-FFF2-40B4-BE49-F238E27FC236}">
+                <a16:creationId xmlns:a16="http://schemas.microsoft.com/office/drawing/2014/main" id="{7908F7B8-FC90-686B-14B9-1C8884CA7441}"/>
+              </a:ext>
+            </a:extLst>
+          </p:cNvPr>
+          <p:cNvGrpSpPr/>
+          <p:nvPr/>
+        </p:nvGrpSpPr>
+        <p:grpSpPr>
+          <a:xfrm>
+            <a:off x="1453040" y="4194215"/>
+            <a:ext cx="1434890" cy="1434890"/>
+            <a:chOff x="1453040" y="4194215"/>
+            <a:chExt cx="1434890" cy="1434890"/>
+          </a:xfrm>
+        </p:grpSpPr>
+        <p:sp>
+          <p:nvSpPr>
+            <p:cNvPr id="10" name="Círculo parcial 9">
+              <a:extLst>
+                <a:ext uri="{FF2B5EF4-FFF2-40B4-BE49-F238E27FC236}">
+                  <a16:creationId xmlns:a16="http://schemas.microsoft.com/office/drawing/2014/main" id="{174D64A5-7FB6-A51A-D6BF-0C079A542095}"/>
+                </a:ext>
+              </a:extLst>
+            </p:cNvPr>
+            <p:cNvSpPr>
+              <a:spLocks noChangeAspect="1"/>
+            </p:cNvSpPr>
+            <p:nvPr/>
+          </p:nvSpPr>
+          <p:spPr>
+            <a:xfrm>
+              <a:off x="1501099" y="4256778"/>
+              <a:ext cx="1338773" cy="1338773"/>
+            </a:xfrm>
+            <a:prstGeom prst="pie">
+              <a:avLst>
+                <a:gd name="adj1" fmla="val 0"/>
+                <a:gd name="adj2" fmla="val 10851302"/>
+              </a:avLst>
+            </a:prstGeom>
+            <a:solidFill>
+              <a:srgbClr val="FEAE01"/>
+            </a:solidFill>
+            <a:ln>
+              <a:noFill/>
+            </a:ln>
+          </p:spPr>
+          <p:style>
+            <a:lnRef idx="2">
+              <a:schemeClr val="accent1">
+                <a:shade val="15000"/>
+              </a:schemeClr>
+            </a:lnRef>
+            <a:fillRef idx="1">
+              <a:schemeClr val="accent1"/>
+            </a:fillRef>
+            <a:effectRef idx="0">
+              <a:schemeClr val="accent1"/>
+            </a:effectRef>
+            <a:fontRef idx="minor">
+              <a:schemeClr val="lt1"/>
+            </a:fontRef>
+          </p:style>
+          <p:txBody>
+            <a:bodyPr rtlCol="0" anchor="ctr"/>
+            <a:lstStyle/>
+            <a:p>
+              <a:pPr algn="ctr"/>
+              <a:endParaRPr lang="es-ES">
+                <a:solidFill>
+                  <a:schemeClr val="tx1"/>
+                </a:solidFill>
+              </a:endParaRPr>
+            </a:p>
+          </p:txBody>
+        </p:sp>
+        <p:sp>
+          <p:nvSpPr>
+            <p:cNvPr id="9" name="Diagrama de flujo: conector 8">
+              <a:extLst>
+                <a:ext uri="{FF2B5EF4-FFF2-40B4-BE49-F238E27FC236}">
+                  <a16:creationId xmlns:a16="http://schemas.microsoft.com/office/drawing/2014/main" id="{F59086CB-71BD-690D-8D4B-76304166BCC1}"/>
+                </a:ext>
+              </a:extLst>
+            </p:cNvPr>
+            <p:cNvSpPr>
+              <a:spLocks noChangeAspect="1"/>
+            </p:cNvSpPr>
+            <p:nvPr/>
+          </p:nvSpPr>
+          <p:spPr>
+            <a:xfrm>
+              <a:off x="1453040" y="4194215"/>
+              <a:ext cx="1434890" cy="1434890"/>
+            </a:xfrm>
+            <a:prstGeom prst="flowChartConnector">
+              <a:avLst/>
+            </a:prstGeom>
+            <a:noFill/>
+            <a:ln>
+              <a:noFill/>
+            </a:ln>
+          </p:spPr>
+          <p:style>
+            <a:lnRef idx="2">
+              <a:schemeClr val="accent1">
+                <a:shade val="15000"/>
+              </a:schemeClr>
+            </a:lnRef>
+            <a:fillRef idx="1">
+              <a:schemeClr val="accent1"/>
+            </a:fillRef>
+            <a:effectRef idx="0">
+              <a:schemeClr val="accent1"/>
+            </a:effectRef>
+            <a:fontRef idx="minor">
+              <a:schemeClr val="lt1"/>
+            </a:fontRef>
+          </p:style>
+          <p:txBody>
+            <a:bodyPr rtlCol="0" anchor="ctr"/>
+            <a:lstStyle/>
+            <a:p>
+              <a:pPr algn="ctr"/>
+              <a:r>
+                <a:rPr lang="es-ES" sz="11500" b="1" i="1" dirty="0">
+                  <a:ln w="9525">
+                    <a:solidFill>
+                      <a:schemeClr val="bg1"/>
+                    </a:solidFill>
+                    <a:prstDash val="solid"/>
+                  </a:ln>
+                  <a:solidFill>
+                    <a:schemeClr val="tx1"/>
+                  </a:solidFill>
+                  <a:effectLst>
+                    <a:outerShdw blurRad="12700" dist="38100" dir="2700000" algn="tl" rotWithShape="0">
+                      <a:schemeClr val="bg1">
+                        <a:lumMod val="50000"/>
+                      </a:schemeClr>
+                    </a:outerShdw>
+                  </a:effectLst>
+                </a:rPr>
+                <a:t>F</a:t>
+              </a:r>
+              <a:endParaRPr lang="es-ES" b="1" i="1" dirty="0">
+                <a:ln w="9525">
+                  <a:solidFill>
+                    <a:schemeClr val="bg1"/>
+                  </a:solidFill>
+                  <a:prstDash val="solid"/>
+                </a:ln>
+                <a:solidFill>
+                  <a:schemeClr val="tx1"/>
+                </a:solidFill>
+                <a:effectLst>
+                  <a:outerShdw blurRad="12700" dist="38100" dir="2700000" algn="tl" rotWithShape="0">
+                    <a:schemeClr val="bg1">
+                      <a:lumMod val="50000"/>
+                    </a:schemeClr>
+                  </a:outerShdw>
+                </a:effectLst>
+              </a:endParaRPr>
+            </a:p>
+          </p:txBody>
+        </p:sp>
+      </p:grpSp>
+      <p:grpSp>
+        <p:nvGrpSpPr>
+          <p:cNvPr id="13" name="Grupo 12">
+            <a:extLst>
+              <a:ext uri="{FF2B5EF4-FFF2-40B4-BE49-F238E27FC236}">
+                <a16:creationId xmlns:a16="http://schemas.microsoft.com/office/drawing/2014/main" id="{49490CA3-4A56-26C3-5131-19FB8D4AE433}"/>
+              </a:ext>
+            </a:extLst>
+          </p:cNvPr>
+          <p:cNvGrpSpPr/>
+          <p:nvPr/>
+        </p:nvGrpSpPr>
+        <p:grpSpPr>
+          <a:xfrm>
+            <a:off x="3287284" y="4256810"/>
+            <a:ext cx="1434890" cy="1434890"/>
+            <a:chOff x="1453040" y="4194215"/>
+            <a:chExt cx="1434890" cy="1434890"/>
+          </a:xfrm>
+        </p:grpSpPr>
+        <p:sp>
+          <p:nvSpPr>
+            <p:cNvPr id="14" name="Círculo parcial 13">
+              <a:extLst>
+                <a:ext uri="{FF2B5EF4-FFF2-40B4-BE49-F238E27FC236}">
+                  <a16:creationId xmlns:a16="http://schemas.microsoft.com/office/drawing/2014/main" id="{C7C3B86A-53F2-AB03-C84C-2C1D77B63E80}"/>
+                </a:ext>
+              </a:extLst>
+            </p:cNvPr>
+            <p:cNvSpPr>
+              <a:spLocks noChangeAspect="1"/>
+            </p:cNvSpPr>
+            <p:nvPr/>
+          </p:nvSpPr>
+          <p:spPr>
+            <a:xfrm>
+              <a:off x="1501099" y="4256778"/>
+              <a:ext cx="1338773" cy="1338773"/>
+            </a:xfrm>
+            <a:prstGeom prst="pie">
+              <a:avLst>
+                <a:gd name="adj1" fmla="val 0"/>
+                <a:gd name="adj2" fmla="val 10851302"/>
+              </a:avLst>
+            </a:prstGeom>
+            <a:solidFill>
+              <a:srgbClr val="FEAE01"/>
+            </a:solidFill>
+            <a:ln>
+              <a:noFill/>
+            </a:ln>
+          </p:spPr>
+          <p:style>
+            <a:lnRef idx="2">
+              <a:schemeClr val="accent1">
+                <a:shade val="15000"/>
+              </a:schemeClr>
+            </a:lnRef>
+            <a:fillRef idx="1">
+              <a:schemeClr val="accent1"/>
+            </a:fillRef>
+            <a:effectRef idx="0">
+              <a:schemeClr val="accent1"/>
+            </a:effectRef>
+            <a:fontRef idx="minor">
+              <a:schemeClr val="lt1"/>
+            </a:fontRef>
+          </p:style>
+          <p:txBody>
+            <a:bodyPr rtlCol="0" anchor="ctr"/>
+            <a:lstStyle/>
+            <a:p>
+              <a:pPr algn="ctr"/>
+              <a:endParaRPr lang="es-ES">
+                <a:solidFill>
+                  <a:schemeClr val="tx1"/>
+                </a:solidFill>
+              </a:endParaRPr>
+            </a:p>
+          </p:txBody>
+        </p:sp>
+        <p:sp>
+          <p:nvSpPr>
+            <p:cNvPr id="15" name="Diagrama de flujo: conector 14">
+              <a:extLst>
+                <a:ext uri="{FF2B5EF4-FFF2-40B4-BE49-F238E27FC236}">
+                  <a16:creationId xmlns:a16="http://schemas.microsoft.com/office/drawing/2014/main" id="{2EC2D684-8180-E345-65A6-3E338F46F561}"/>
+                </a:ext>
+              </a:extLst>
+            </p:cNvPr>
+            <p:cNvSpPr>
+              <a:spLocks noChangeAspect="1"/>
+            </p:cNvSpPr>
+            <p:nvPr/>
+          </p:nvSpPr>
+          <p:spPr>
+            <a:xfrm>
+              <a:off x="1453040" y="4194215"/>
+              <a:ext cx="1434890" cy="1434890"/>
+            </a:xfrm>
+            <a:prstGeom prst="flowChartConnector">
+              <a:avLst/>
+            </a:prstGeom>
+            <a:noFill/>
+            <a:ln>
+              <a:noFill/>
+            </a:ln>
+          </p:spPr>
+          <p:style>
+            <a:lnRef idx="2">
+              <a:schemeClr val="accent1">
+                <a:shade val="15000"/>
+              </a:schemeClr>
+            </a:lnRef>
+            <a:fillRef idx="1">
+              <a:schemeClr val="accent1"/>
+            </a:fillRef>
+            <a:effectRef idx="0">
+              <a:schemeClr val="accent1"/>
+            </a:effectRef>
+            <a:fontRef idx="minor">
+              <a:schemeClr val="lt1"/>
+            </a:fontRef>
+          </p:style>
+          <p:txBody>
+            <a:bodyPr rtlCol="0" anchor="ctr"/>
+            <a:lstStyle/>
+            <a:p>
+              <a:pPr algn="ctr"/>
+              <a:r>
+                <a:rPr lang="es-ES" sz="11500" b="1" i="1" dirty="0">
+                  <a:ln w="9525">
+                    <a:solidFill>
+                      <a:schemeClr val="bg1"/>
+                    </a:solidFill>
+                    <a:prstDash val="solid"/>
+                  </a:ln>
+                  <a:solidFill>
+                    <a:schemeClr val="tx1"/>
+                  </a:solidFill>
+                  <a:effectLst>
+                    <a:outerShdw blurRad="12700" dist="38100" dir="2700000" algn="tl" rotWithShape="0">
+                      <a:schemeClr val="bg1">
+                        <a:lumMod val="50000"/>
+                      </a:schemeClr>
+                    </a:outerShdw>
+                  </a:effectLst>
+                </a:rPr>
+                <a:t>Q</a:t>
+              </a:r>
+              <a:endParaRPr lang="es-ES" b="1" i="1" dirty="0">
+                <a:ln w="9525">
+                  <a:solidFill>
+                    <a:schemeClr val="bg1"/>
+                  </a:solidFill>
+                  <a:prstDash val="solid"/>
+                </a:ln>
+                <a:solidFill>
+                  <a:schemeClr val="tx1"/>
+                </a:solidFill>
+                <a:effectLst>
+                  <a:outerShdw blurRad="12700" dist="38100" dir="2700000" algn="tl" rotWithShape="0">
+                    <a:schemeClr val="bg1">
+                      <a:lumMod val="50000"/>
+                    </a:schemeClr>
+                  </a:outerShdw>
+                </a:effectLst>
+              </a:endParaRPr>
+            </a:p>
+          </p:txBody>
+        </p:sp>
+      </p:grpSp>
+    </p:spTree>
+    <p:extLst>
+      <p:ext uri="{BB962C8B-B14F-4D97-AF65-F5344CB8AC3E}">
+        <p14:creationId xmlns:p14="http://schemas.microsoft.com/office/powerpoint/2010/main" val="1520355779"/>
+      </p:ext>
+    </p:extLst>
+  </p:cSld>
+  <p:clrMapOvr>
+    <a:masterClrMapping/>
+  </p:clrMapOvr>
+</p:sld>
+</file>
+
+<file path=ppt/slides/slide3.xml><?xml version="1.0" encoding="utf-8"?>
+<p:sld xmlns:a="http://schemas.openxmlformats.org/drawingml/2006/main" xmlns:r="http://schemas.openxmlformats.org/officeDocument/2006/relationships" xmlns:p="http://schemas.openxmlformats.org/presentationml/2006/main">
+  <p:cSld>
+    <p:spTree>
+      <p:nvGrpSpPr>
+        <p:cNvPr id="1" name=""/>
+        <p:cNvGrpSpPr/>
+        <p:nvPr/>
+      </p:nvGrpSpPr>
+      <p:grpSpPr>
+        <a:xfrm>
+          <a:off x="0" y="0"/>
+          <a:ext cx="0" cy="0"/>
+          <a:chOff x="0" y="0"/>
+          <a:chExt cx="0" cy="0"/>
+        </a:xfrm>
+      </p:grpSpPr>
+      <p:pic>
+        <p:nvPicPr>
+          <p:cNvPr id="11" name="Imagen 10" descr="Icono&#10;&#10;Descripción generada automáticamente">
+            <a:extLst>
+              <a:ext uri="{FF2B5EF4-FFF2-40B4-BE49-F238E27FC236}">
+                <a16:creationId xmlns:a16="http://schemas.microsoft.com/office/drawing/2014/main" id="{E1220DC8-8A94-9397-1F11-CF699FD99517}"/>
+              </a:ext>
+            </a:extLst>
+          </p:cNvPr>
+          <p:cNvPicPr>
+            <a:picLocks noChangeAspect="1"/>
+          </p:cNvPicPr>
+          <p:nvPr/>
+        </p:nvPicPr>
+        <p:blipFill>
+          <a:blip r:embed="rId2">
+            <a:clrChange>
+              <a:clrFrom>
+                <a:srgbClr val="000000">
+                  <a:alpha val="0"/>
+                </a:srgbClr>
+              </a:clrFrom>
+              <a:clrTo>
+                <a:srgbClr val="000000">
+                  <a:alpha val="0"/>
+                </a:srgbClr>
+              </a:clrTo>
+            </a:clrChange>
+            <a:extLst>
+              <a:ext uri="{BEBA8EAE-BF5A-486C-A8C5-ECC9F3942E4B}">
+                <a14:imgProps xmlns:a14="http://schemas.microsoft.com/office/drawing/2010/main">
+                  <a14:imgLayer r:embed="rId3">
+                    <a14:imgEffect>
+                      <a14:backgroundRemoval t="8594" b="90625" l="9082" r="90723">
+                        <a14:foregroundMark x1="49121" y1="8594" x2="49121" y2="8594"/>
+                        <a14:foregroundMark x1="90820" y1="49316" x2="90820" y2="49316"/>
+                        <a14:foregroundMark x1="87500" y1="80469" x2="87500" y2="80469"/>
+                        <a14:foregroundMark x1="49805" y1="90625" x2="49805" y2="90625"/>
+                        <a14:foregroundMark x1="9082" y1="45801" x2="9082" y2="45801"/>
+                        <a14:backgroundMark x1="6152" y1="3613" x2="6152" y2="3613"/>
+                      </a14:backgroundRemoval>
+                    </a14:imgEffect>
+                  </a14:imgLayer>
+                </a14:imgProps>
+              </a:ext>
+            </a:extLst>
+          </a:blip>
+          <a:srcRect l="6736" t="6300" r="6862" b="6930"/>
+          <a:stretch/>
+        </p:blipFill>
+        <p:spPr>
+          <a:xfrm>
+            <a:off x="7856401" y="572743"/>
+            <a:ext cx="3344779" cy="3358976"/>
+          </a:xfrm>
+          <a:prstGeom prst="rect">
+            <a:avLst/>
+          </a:prstGeom>
+          <a:noFill/>
+        </p:spPr>
+      </p:pic>
+      <p:grpSp>
+        <p:nvGrpSpPr>
+          <p:cNvPr id="19" name="Grupo 18">
+            <a:extLst>
+              <a:ext uri="{FF2B5EF4-FFF2-40B4-BE49-F238E27FC236}">
+                <a16:creationId xmlns:a16="http://schemas.microsoft.com/office/drawing/2014/main" id="{68BD6912-EC8D-062A-38F7-EE6BC4F91B84}"/>
+              </a:ext>
+            </a:extLst>
+          </p:cNvPr>
+          <p:cNvGrpSpPr/>
+          <p:nvPr/>
+        </p:nvGrpSpPr>
+        <p:grpSpPr>
+          <a:xfrm>
+            <a:off x="424616" y="2946552"/>
+            <a:ext cx="3344779" cy="3358976"/>
+            <a:chOff x="498096" y="366635"/>
+            <a:chExt cx="3344779" cy="3358976"/>
+          </a:xfrm>
+        </p:grpSpPr>
+        <p:grpSp>
+          <p:nvGrpSpPr>
+            <p:cNvPr id="5" name="Grupo 4">
+              <a:extLst>
+                <a:ext uri="{FF2B5EF4-FFF2-40B4-BE49-F238E27FC236}">
+                  <a16:creationId xmlns:a16="http://schemas.microsoft.com/office/drawing/2014/main" id="{44C74E87-1D26-80C2-2487-2E5680FEB401}"/>
+                </a:ext>
+              </a:extLst>
+            </p:cNvPr>
+            <p:cNvGrpSpPr/>
+            <p:nvPr/>
+          </p:nvGrpSpPr>
+          <p:grpSpPr>
+            <a:xfrm>
+              <a:off x="498096" y="366635"/>
+              <a:ext cx="3344779" cy="3358976"/>
+              <a:chOff x="498096" y="366635"/>
+              <a:chExt cx="3344779" cy="3358976"/>
+            </a:xfrm>
+          </p:grpSpPr>
+          <p:pic>
+            <p:nvPicPr>
+              <p:cNvPr id="2" name="Imagen 1" descr="Icono&#10;&#10;Descripción generada automáticamente">
+                <a:extLst>
+                  <a:ext uri="{FF2B5EF4-FFF2-40B4-BE49-F238E27FC236}">
+                    <a16:creationId xmlns:a16="http://schemas.microsoft.com/office/drawing/2014/main" id="{EFDA082D-DD87-D214-9FF6-747041D29134}"/>
+                  </a:ext>
+                </a:extLst>
+              </p:cNvPr>
+              <p:cNvPicPr>
+                <a:picLocks noChangeAspect="1"/>
+              </p:cNvPicPr>
+              <p:nvPr/>
+            </p:nvPicPr>
+            <p:blipFill>
+              <a:blip r:embed="rId2">
+                <a:clrChange>
+                  <a:clrFrom>
+                    <a:srgbClr val="000000">
+                      <a:alpha val="0"/>
+                    </a:srgbClr>
+                  </a:clrFrom>
+                  <a:clrTo>
+                    <a:srgbClr val="000000">
+                      <a:alpha val="0"/>
+                    </a:srgbClr>
+                  </a:clrTo>
+                </a:clrChange>
+                <a:extLst>
+                  <a:ext uri="{BEBA8EAE-BF5A-486C-A8C5-ECC9F3942E4B}">
+                    <a14:imgProps xmlns:a14="http://schemas.microsoft.com/office/drawing/2010/main">
+                      <a14:imgLayer r:embed="rId3">
+                        <a14:imgEffect>
+                          <a14:backgroundRemoval t="8594" b="90625" l="9082" r="90723">
+                            <a14:foregroundMark x1="49121" y1="8594" x2="49121" y2="8594"/>
+                            <a14:foregroundMark x1="90820" y1="49316" x2="90820" y2="49316"/>
+                            <a14:foregroundMark x1="87500" y1="80469" x2="87500" y2="80469"/>
+                            <a14:foregroundMark x1="49805" y1="90625" x2="49805" y2="90625"/>
+                            <a14:foregroundMark x1="9082" y1="45801" x2="9082" y2="45801"/>
+                            <a14:backgroundMark x1="6152" y1="3613" x2="6152" y2="3613"/>
+                          </a14:backgroundRemoval>
+                        </a14:imgEffect>
+                      </a14:imgLayer>
+                    </a14:imgProps>
+                  </a:ext>
+                </a:extLst>
+              </a:blip>
+              <a:srcRect l="6736" t="6300" r="6862" b="6930"/>
+              <a:stretch/>
+            </p:blipFill>
+            <p:spPr>
+              <a:xfrm>
+                <a:off x="498096" y="366635"/>
+                <a:ext cx="3344779" cy="3358976"/>
+              </a:xfrm>
+              <a:prstGeom prst="rect">
+                <a:avLst/>
+              </a:prstGeom>
+              <a:noFill/>
+            </p:spPr>
+          </p:pic>
+          <p:sp>
+            <p:nvSpPr>
+              <p:cNvPr id="3" name="Círculo parcial 2">
+                <a:extLst>
+                  <a:ext uri="{FF2B5EF4-FFF2-40B4-BE49-F238E27FC236}">
+                    <a16:creationId xmlns:a16="http://schemas.microsoft.com/office/drawing/2014/main" id="{CCDFBD4F-5DD8-4B6C-6A0C-F0209ABDFA62}"/>
+                  </a:ext>
+                </a:extLst>
+              </p:cNvPr>
+              <p:cNvSpPr>
+                <a:spLocks noChangeAspect="1"/>
+              </p:cNvSpPr>
+              <p:nvPr/>
+            </p:nvSpPr>
+            <p:spPr>
+              <a:xfrm flipV="1">
+                <a:off x="1471157" y="1342118"/>
+                <a:ext cx="1410832" cy="1410832"/>
+              </a:xfrm>
+              <a:prstGeom prst="pie">
+                <a:avLst>
+                  <a:gd name="adj1" fmla="val 0"/>
+                  <a:gd name="adj2" fmla="val 10851302"/>
+                </a:avLst>
+              </a:prstGeom>
+              <a:solidFill>
+                <a:schemeClr val="bg1"/>
+              </a:solidFill>
+              <a:ln>
+                <a:noFill/>
+              </a:ln>
+            </p:spPr>
+            <p:style>
+              <a:lnRef idx="2">
+                <a:schemeClr val="accent1">
+                  <a:shade val="15000"/>
+                </a:schemeClr>
+              </a:lnRef>
+              <a:fillRef idx="1">
+                <a:schemeClr val="accent1"/>
+              </a:fillRef>
+              <a:effectRef idx="0">
+                <a:schemeClr val="accent1"/>
+              </a:effectRef>
+              <a:fontRef idx="minor">
+                <a:schemeClr val="lt1"/>
+              </a:fontRef>
+            </p:style>
+            <p:txBody>
+              <a:bodyPr rtlCol="0" anchor="ctr"/>
+              <a:lstStyle/>
+              <a:p>
+                <a:pPr algn="ctr"/>
+                <a:endParaRPr lang="es-ES" dirty="0">
+                  <a:solidFill>
+                    <a:schemeClr val="tx1"/>
+                  </a:solidFill>
+                </a:endParaRPr>
+              </a:p>
+            </p:txBody>
+          </p:sp>
+        </p:grpSp>
+        <p:grpSp>
+          <p:nvGrpSpPr>
+            <p:cNvPr id="12" name="Grupo 11">
+              <a:extLst>
+                <a:ext uri="{FF2B5EF4-FFF2-40B4-BE49-F238E27FC236}">
+                  <a16:creationId xmlns:a16="http://schemas.microsoft.com/office/drawing/2014/main" id="{7908F7B8-FC90-686B-14B9-1C8884CA7441}"/>
+                </a:ext>
+              </a:extLst>
+            </p:cNvPr>
+            <p:cNvGrpSpPr/>
+            <p:nvPr/>
+          </p:nvGrpSpPr>
+          <p:grpSpPr>
+            <a:xfrm>
+              <a:off x="1461214" y="1320383"/>
+              <a:ext cx="1434890" cy="1434890"/>
+              <a:chOff x="1453040" y="4194215"/>
+              <a:chExt cx="1434890" cy="1434890"/>
+            </a:xfrm>
+          </p:grpSpPr>
+          <p:sp>
+            <p:nvSpPr>
+              <p:cNvPr id="10" name="Círculo parcial 9">
+                <a:extLst>
+                  <a:ext uri="{FF2B5EF4-FFF2-40B4-BE49-F238E27FC236}">
+                    <a16:creationId xmlns:a16="http://schemas.microsoft.com/office/drawing/2014/main" id="{174D64A5-7FB6-A51A-D6BF-0C079A542095}"/>
+                  </a:ext>
+                </a:extLst>
+              </p:cNvPr>
+              <p:cNvSpPr>
+                <a:spLocks noChangeAspect="1"/>
+              </p:cNvSpPr>
+              <p:nvPr/>
+            </p:nvSpPr>
+            <p:spPr>
+              <a:xfrm>
+                <a:off x="1501099" y="4256778"/>
+                <a:ext cx="1338773" cy="1338773"/>
+              </a:xfrm>
+              <a:prstGeom prst="pie">
+                <a:avLst>
+                  <a:gd name="adj1" fmla="val 0"/>
+                  <a:gd name="adj2" fmla="val 10851302"/>
+                </a:avLst>
+              </a:prstGeom>
+              <a:solidFill>
+                <a:srgbClr val="FEAE01"/>
+              </a:solidFill>
+              <a:ln>
+                <a:noFill/>
+              </a:ln>
+            </p:spPr>
+            <p:style>
+              <a:lnRef idx="2">
+                <a:schemeClr val="accent1">
+                  <a:shade val="15000"/>
+                </a:schemeClr>
+              </a:lnRef>
+              <a:fillRef idx="1">
+                <a:schemeClr val="accent1"/>
+              </a:fillRef>
+              <a:effectRef idx="0">
+                <a:schemeClr val="accent1"/>
+              </a:effectRef>
+              <a:fontRef idx="minor">
+                <a:schemeClr val="lt1"/>
+              </a:fontRef>
+            </p:style>
+            <p:txBody>
+              <a:bodyPr rtlCol="0" anchor="ctr"/>
+              <a:lstStyle/>
+              <a:p>
+                <a:pPr algn="ctr"/>
+                <a:endParaRPr lang="es-ES">
+                  <a:solidFill>
+                    <a:schemeClr val="tx1"/>
+                  </a:solidFill>
+                </a:endParaRPr>
+              </a:p>
+            </p:txBody>
+          </p:sp>
+          <p:sp>
+            <p:nvSpPr>
+              <p:cNvPr id="9" name="Diagrama de flujo: conector 8">
+                <a:extLst>
+                  <a:ext uri="{FF2B5EF4-FFF2-40B4-BE49-F238E27FC236}">
+                    <a16:creationId xmlns:a16="http://schemas.microsoft.com/office/drawing/2014/main" id="{F59086CB-71BD-690D-8D4B-76304166BCC1}"/>
+                  </a:ext>
+                </a:extLst>
+              </p:cNvPr>
+              <p:cNvSpPr>
+                <a:spLocks noChangeAspect="1"/>
+              </p:cNvSpPr>
+              <p:nvPr/>
+            </p:nvSpPr>
+            <p:spPr>
+              <a:xfrm>
+                <a:off x="1453040" y="4194215"/>
+                <a:ext cx="1434890" cy="1434890"/>
+              </a:xfrm>
+              <a:prstGeom prst="flowChartConnector">
+                <a:avLst/>
+              </a:prstGeom>
+              <a:noFill/>
+              <a:ln>
+                <a:noFill/>
+              </a:ln>
+            </p:spPr>
+            <p:style>
+              <a:lnRef idx="2">
+                <a:schemeClr val="accent1">
+                  <a:shade val="15000"/>
+                </a:schemeClr>
+              </a:lnRef>
+              <a:fillRef idx="1">
+                <a:schemeClr val="accent1"/>
+              </a:fillRef>
+              <a:effectRef idx="0">
+                <a:schemeClr val="accent1"/>
+              </a:effectRef>
+              <a:fontRef idx="minor">
+                <a:schemeClr val="lt1"/>
+              </a:fontRef>
+            </p:style>
+            <p:txBody>
+              <a:bodyPr rtlCol="0" anchor="ctr"/>
+              <a:lstStyle/>
+              <a:p>
+                <a:pPr algn="ctr"/>
+                <a:r>
+                  <a:rPr lang="es-ES" sz="11500" b="1" dirty="0">
+                    <a:ln w="9525">
+                      <a:solidFill>
+                        <a:schemeClr val="bg1"/>
+                      </a:solidFill>
+                      <a:prstDash val="solid"/>
+                    </a:ln>
+                    <a:solidFill>
+                      <a:schemeClr val="tx1"/>
+                    </a:solidFill>
+                    <a:latin typeface="Arial Rounded MT Bold" panose="020F0704030504030204" pitchFamily="34" charset="0"/>
+                  </a:rPr>
+                  <a:t>F</a:t>
+                </a:r>
+                <a:endParaRPr lang="es-ES" b="1" dirty="0">
+                  <a:ln w="9525">
+                    <a:solidFill>
+                      <a:schemeClr val="bg1"/>
+                    </a:solidFill>
+                    <a:prstDash val="solid"/>
+                  </a:ln>
+                  <a:solidFill>
+                    <a:schemeClr val="tx1"/>
+                  </a:solidFill>
+                  <a:latin typeface="Arial Rounded MT Bold" panose="020F0704030504030204" pitchFamily="34" charset="0"/>
+                </a:endParaRPr>
+              </a:p>
+            </p:txBody>
+          </p:sp>
+        </p:grpSp>
+      </p:grpSp>
+      <p:grpSp>
+        <p:nvGrpSpPr>
+          <p:cNvPr id="18" name="Grupo 17">
+            <a:extLst>
+              <a:ext uri="{FF2B5EF4-FFF2-40B4-BE49-F238E27FC236}">
+                <a16:creationId xmlns:a16="http://schemas.microsoft.com/office/drawing/2014/main" id="{330DA753-319C-2155-7042-42AEEA58262D}"/>
+              </a:ext>
+            </a:extLst>
+          </p:cNvPr>
+          <p:cNvGrpSpPr/>
+          <p:nvPr/>
+        </p:nvGrpSpPr>
+        <p:grpSpPr>
+          <a:xfrm>
+            <a:off x="3932345" y="366635"/>
+            <a:ext cx="3344779" cy="3358976"/>
+            <a:chOff x="3932345" y="366635"/>
+            <a:chExt cx="3344779" cy="3358976"/>
+          </a:xfrm>
+        </p:grpSpPr>
+        <p:grpSp>
+          <p:nvGrpSpPr>
+            <p:cNvPr id="7" name="Grupo 6">
+              <a:extLst>
+                <a:ext uri="{FF2B5EF4-FFF2-40B4-BE49-F238E27FC236}">
+                  <a16:creationId xmlns:a16="http://schemas.microsoft.com/office/drawing/2014/main" id="{F89727AF-2BC5-94C4-2457-B8BF977A6F06}"/>
+                </a:ext>
+              </a:extLst>
+            </p:cNvPr>
+            <p:cNvGrpSpPr/>
+            <p:nvPr/>
+          </p:nvGrpSpPr>
+          <p:grpSpPr>
+            <a:xfrm>
+              <a:off x="3932345" y="366635"/>
+              <a:ext cx="3344779" cy="3358976"/>
+              <a:chOff x="498096" y="366635"/>
+              <a:chExt cx="3344779" cy="3358976"/>
+            </a:xfrm>
+          </p:grpSpPr>
+          <p:pic>
+            <p:nvPicPr>
+              <p:cNvPr id="16" name="Imagen 15" descr="Icono&#10;&#10;Descripción generada automáticamente">
+                <a:extLst>
+                  <a:ext uri="{FF2B5EF4-FFF2-40B4-BE49-F238E27FC236}">
+                    <a16:creationId xmlns:a16="http://schemas.microsoft.com/office/drawing/2014/main" id="{549A1315-5E76-6C66-B455-019405E59AEF}"/>
+                  </a:ext>
+                </a:extLst>
+              </p:cNvPr>
+              <p:cNvPicPr>
+                <a:picLocks noChangeAspect="1"/>
+              </p:cNvPicPr>
+              <p:nvPr/>
+            </p:nvPicPr>
+            <p:blipFill>
+              <a:blip r:embed="rId2">
+                <a:clrChange>
+                  <a:clrFrom>
+                    <a:srgbClr val="000000">
+                      <a:alpha val="0"/>
+                    </a:srgbClr>
+                  </a:clrFrom>
+                  <a:clrTo>
+                    <a:srgbClr val="000000">
+                      <a:alpha val="0"/>
+                    </a:srgbClr>
+                  </a:clrTo>
+                </a:clrChange>
+                <a:extLst>
+                  <a:ext uri="{BEBA8EAE-BF5A-486C-A8C5-ECC9F3942E4B}">
+                    <a14:imgProps xmlns:a14="http://schemas.microsoft.com/office/drawing/2010/main">
+                      <a14:imgLayer r:embed="rId3">
+                        <a14:imgEffect>
+                          <a14:backgroundRemoval t="8594" b="90625" l="9082" r="90723">
+                            <a14:foregroundMark x1="49121" y1="8594" x2="49121" y2="8594"/>
+                            <a14:foregroundMark x1="90820" y1="49316" x2="90820" y2="49316"/>
+                            <a14:foregroundMark x1="87500" y1="80469" x2="87500" y2="80469"/>
+                            <a14:foregroundMark x1="49805" y1="90625" x2="49805" y2="90625"/>
+                            <a14:foregroundMark x1="9082" y1="45801" x2="9082" y2="45801"/>
+                            <a14:backgroundMark x1="6152" y1="3613" x2="6152" y2="3613"/>
+                          </a14:backgroundRemoval>
+                        </a14:imgEffect>
+                      </a14:imgLayer>
+                    </a14:imgProps>
+                  </a:ext>
+                </a:extLst>
+              </a:blip>
+              <a:srcRect l="6736" t="6300" r="6862" b="6930"/>
+              <a:stretch/>
+            </p:blipFill>
+            <p:spPr>
+              <a:xfrm>
+                <a:off x="498096" y="366635"/>
+                <a:ext cx="3344779" cy="3358976"/>
+              </a:xfrm>
+              <a:prstGeom prst="rect">
+                <a:avLst/>
+              </a:prstGeom>
+              <a:noFill/>
+            </p:spPr>
+          </p:pic>
+          <p:sp>
+            <p:nvSpPr>
+              <p:cNvPr id="17" name="Círculo parcial 16">
+                <a:extLst>
+                  <a:ext uri="{FF2B5EF4-FFF2-40B4-BE49-F238E27FC236}">
+                    <a16:creationId xmlns:a16="http://schemas.microsoft.com/office/drawing/2014/main" id="{595509A5-79E9-0C14-CE8F-5D74BC1659DA}"/>
+                  </a:ext>
+                </a:extLst>
+              </p:cNvPr>
+              <p:cNvSpPr>
+                <a:spLocks noChangeAspect="1"/>
+              </p:cNvSpPr>
+              <p:nvPr/>
+            </p:nvSpPr>
+            <p:spPr>
+              <a:xfrm flipV="1">
+                <a:off x="1471157" y="1342118"/>
+                <a:ext cx="1410832" cy="1410832"/>
+              </a:xfrm>
+              <a:prstGeom prst="pie">
+                <a:avLst>
+                  <a:gd name="adj1" fmla="val 0"/>
+                  <a:gd name="adj2" fmla="val 10851302"/>
+                </a:avLst>
+              </a:prstGeom>
+              <a:solidFill>
+                <a:schemeClr val="bg1"/>
+              </a:solidFill>
+              <a:ln>
+                <a:noFill/>
+              </a:ln>
+            </p:spPr>
+            <p:style>
+              <a:lnRef idx="2">
+                <a:schemeClr val="accent1">
+                  <a:shade val="15000"/>
+                </a:schemeClr>
+              </a:lnRef>
+              <a:fillRef idx="1">
+                <a:schemeClr val="accent1"/>
+              </a:fillRef>
+              <a:effectRef idx="0">
+                <a:schemeClr val="accent1"/>
+              </a:effectRef>
+              <a:fontRef idx="minor">
+                <a:schemeClr val="lt1"/>
+              </a:fontRef>
+            </p:style>
+            <p:txBody>
+              <a:bodyPr rtlCol="0" anchor="ctr"/>
+              <a:lstStyle/>
+              <a:p>
+                <a:pPr algn="ctr"/>
+                <a:endParaRPr lang="es-ES" dirty="0">
+                  <a:solidFill>
+                    <a:schemeClr val="tx1"/>
+                  </a:solidFill>
+                </a:endParaRPr>
+              </a:p>
+            </p:txBody>
+          </p:sp>
+        </p:grpSp>
+        <p:grpSp>
+          <p:nvGrpSpPr>
+            <p:cNvPr id="13" name="Grupo 12">
+              <a:extLst>
+                <a:ext uri="{FF2B5EF4-FFF2-40B4-BE49-F238E27FC236}">
+                  <a16:creationId xmlns:a16="http://schemas.microsoft.com/office/drawing/2014/main" id="{49490CA3-4A56-26C3-5131-19FB8D4AE433}"/>
+                </a:ext>
+              </a:extLst>
+            </p:cNvPr>
+            <p:cNvGrpSpPr/>
+            <p:nvPr/>
+          </p:nvGrpSpPr>
+          <p:grpSpPr>
+            <a:xfrm>
+              <a:off x="4879317" y="1309502"/>
+              <a:ext cx="1434890" cy="1434890"/>
+              <a:chOff x="1453040" y="4194215"/>
+              <a:chExt cx="1434890" cy="1434890"/>
+            </a:xfrm>
+          </p:grpSpPr>
+          <p:sp>
+            <p:nvSpPr>
+              <p:cNvPr id="14" name="Círculo parcial 13">
+                <a:extLst>
+                  <a:ext uri="{FF2B5EF4-FFF2-40B4-BE49-F238E27FC236}">
+                    <a16:creationId xmlns:a16="http://schemas.microsoft.com/office/drawing/2014/main" id="{C7C3B86A-53F2-AB03-C84C-2C1D77B63E80}"/>
+                  </a:ext>
+                </a:extLst>
+              </p:cNvPr>
+              <p:cNvSpPr>
+                <a:spLocks noChangeAspect="1"/>
+              </p:cNvSpPr>
+              <p:nvPr/>
+            </p:nvSpPr>
+            <p:spPr>
+              <a:xfrm>
+                <a:off x="1501099" y="4256778"/>
+                <a:ext cx="1338773" cy="1338773"/>
+              </a:xfrm>
+              <a:prstGeom prst="pie">
+                <a:avLst>
+                  <a:gd name="adj1" fmla="val 0"/>
+                  <a:gd name="adj2" fmla="val 10851302"/>
+                </a:avLst>
+              </a:prstGeom>
+              <a:solidFill>
+                <a:srgbClr val="FEAE01"/>
+              </a:solidFill>
+              <a:ln>
+                <a:noFill/>
+              </a:ln>
+            </p:spPr>
+            <p:style>
+              <a:lnRef idx="2">
+                <a:schemeClr val="accent1">
+                  <a:shade val="15000"/>
+                </a:schemeClr>
+              </a:lnRef>
+              <a:fillRef idx="1">
+                <a:schemeClr val="accent1"/>
+              </a:fillRef>
+              <a:effectRef idx="0">
+                <a:schemeClr val="accent1"/>
+              </a:effectRef>
+              <a:fontRef idx="minor">
+                <a:schemeClr val="lt1"/>
+              </a:fontRef>
+            </p:style>
+            <p:txBody>
+              <a:bodyPr rtlCol="0" anchor="ctr"/>
+              <a:lstStyle/>
+              <a:p>
+                <a:pPr algn="ctr"/>
+                <a:endParaRPr lang="es-ES">
+                  <a:solidFill>
+                    <a:schemeClr val="tx1"/>
+                  </a:solidFill>
+                </a:endParaRPr>
+              </a:p>
+            </p:txBody>
+          </p:sp>
+          <p:sp>
+            <p:nvSpPr>
+              <p:cNvPr id="15" name="Diagrama de flujo: conector 14">
+                <a:extLst>
+                  <a:ext uri="{FF2B5EF4-FFF2-40B4-BE49-F238E27FC236}">
+                    <a16:creationId xmlns:a16="http://schemas.microsoft.com/office/drawing/2014/main" id="{2EC2D684-8180-E345-65A6-3E338F46F561}"/>
+                  </a:ext>
+                </a:extLst>
+              </p:cNvPr>
+              <p:cNvSpPr>
+                <a:spLocks noChangeAspect="1"/>
+              </p:cNvSpPr>
+              <p:nvPr/>
+            </p:nvSpPr>
+            <p:spPr>
+              <a:xfrm>
+                <a:off x="1453040" y="4194215"/>
+                <a:ext cx="1434890" cy="1434890"/>
+              </a:xfrm>
+              <a:prstGeom prst="flowChartConnector">
+                <a:avLst/>
+              </a:prstGeom>
+              <a:noFill/>
+              <a:ln>
+                <a:noFill/>
+              </a:ln>
+            </p:spPr>
+            <p:style>
+              <a:lnRef idx="2">
+                <a:schemeClr val="accent1">
+                  <a:shade val="15000"/>
+                </a:schemeClr>
+              </a:lnRef>
+              <a:fillRef idx="1">
+                <a:schemeClr val="accent1"/>
+              </a:fillRef>
+              <a:effectRef idx="0">
+                <a:schemeClr val="accent1"/>
+              </a:effectRef>
+              <a:fontRef idx="minor">
+                <a:schemeClr val="lt1"/>
+              </a:fontRef>
+            </p:style>
+            <p:txBody>
+              <a:bodyPr rtlCol="0" anchor="ctr"/>
+              <a:lstStyle/>
+              <a:p>
+                <a:pPr algn="ctr"/>
+                <a:r>
+                  <a:rPr lang="es-ES" sz="11500" b="1" dirty="0">
+                    <a:ln w="9525">
+                      <a:solidFill>
+                        <a:schemeClr val="bg1"/>
+                      </a:solidFill>
+                      <a:prstDash val="solid"/>
+                    </a:ln>
+                    <a:solidFill>
+                      <a:schemeClr val="tx1"/>
+                    </a:solidFill>
+                    <a:latin typeface="Arial Rounded MT Bold" panose="020F0704030504030204" pitchFamily="34" charset="0"/>
+                  </a:rPr>
+                  <a:t>Q</a:t>
+                </a:r>
+                <a:endParaRPr lang="es-ES" b="1" dirty="0">
+                  <a:ln w="9525">
+                    <a:solidFill>
+                      <a:schemeClr val="bg1"/>
+                    </a:solidFill>
+                    <a:prstDash val="solid"/>
+                  </a:ln>
+                  <a:solidFill>
+                    <a:schemeClr val="tx1"/>
+                  </a:solidFill>
+                  <a:latin typeface="Arial Rounded MT Bold" panose="020F0704030504030204" pitchFamily="34" charset="0"/>
+                </a:endParaRPr>
+              </a:p>
+            </p:txBody>
+          </p:sp>
+        </p:grpSp>
+      </p:grpSp>
+    </p:spTree>
+    <p:extLst>
+      <p:ext uri="{BB962C8B-B14F-4D97-AF65-F5344CB8AC3E}">
+        <p14:creationId xmlns:p14="http://schemas.microsoft.com/office/powerpoint/2010/main" val="3131872882"/>
+      </p:ext>
+    </p:extLst>
+  </p:cSld>
+  <p:clrMapOvr>
+    <a:masterClrMapping/>
+  </p:clrMapOvr>
+</p:sld>
+</file>
+
 <file path=ppt/theme/theme1.xml><?xml version="1.0" encoding="utf-8"?>
 <a:theme xmlns:a="http://schemas.openxmlformats.org/drawingml/2006/main" name="Tema de Office">
   <a:themeElements>

</xml_diff>